<commit_message>
Update Metaprogramming in .NET.pptx
</commit_message>
<xml_diff>
--- a/Metaprogramming in .NET.pptx
+++ b/Metaprogramming in .NET.pptx
@@ -12385,7 +12385,7 @@
             </a:pPr>
             <a:r>
               <a:rPr lang="en-US" sz="4000" dirty="0"/>
-              <a:t>https://github.com/JasonBock/Presentations</a:t>
+              <a:t>https://github.com/JasonBock/Presentations/blob/master/Metaprogramming%20in%20.NET.pptx</a:t>
             </a:r>
           </a:p>
         </p:txBody>
@@ -15908,8 +15908,8 @@
         </p:nvSpPr>
         <p:spPr>
           <a:xfrm>
-            <a:off x="4836160" y="3429000"/>
-            <a:ext cx="7227373" cy="2293070"/>
+            <a:off x="4003040" y="3429000"/>
+            <a:ext cx="8060493" cy="2293070"/>
           </a:xfrm>
           <a:prstGeom prst="rect">
             <a:avLst/>
@@ -15917,7 +15917,7 @@
         </p:spPr>
         <p:txBody>
           <a:bodyPr vert="horz" lIns="91440" tIns="45720" rIns="91440" bIns="45720" rtlCol="0" anchor="ctr" anchorCtr="0">
-            <a:normAutofit fontScale="92500" lnSpcReduction="10000"/>
+            <a:normAutofit fontScale="85000" lnSpcReduction="20000"/>
           </a:bodyPr>
           <a:lstStyle>
             <a:lvl1pPr marL="342900" indent="-274320" algn="l" defTabSz="914400" rtl="0" eaLnBrk="1" latinLnBrk="0" hangingPunct="1">
@@ -16142,7 +16142,7 @@
               <a:rPr lang="en-US" sz="2800" dirty="0">
                 <a:latin typeface="+mn-lt"/>
               </a:rPr>
-              <a:t>https://github.com/JasonBock/Presentations</a:t>
+              <a:t>https://github.com/JasonBock/Presentations/blob/master/Metaprogramming%20in%20.NET.pptx</a:t>
             </a:r>
           </a:p>
         </p:txBody>
@@ -17653,7 +17653,7 @@
         <p:spPr>
           <a:xfrm>
             <a:off x="1971763" y="4103007"/>
-            <a:ext cx="6603277" cy="1766119"/>
+            <a:ext cx="6324823" cy="1766119"/>
           </a:xfrm>
           <a:prstGeom prst="rect">
             <a:avLst/>
@@ -17707,7 +17707,7 @@
             </a:pPr>
             <a:r>
               <a:rPr lang="en-US" dirty="0"/>
-              <a:t>https://github.com/JasonBock/Presentations</a:t>
+              <a:t>https://github.com/JasonBock/Presentations/blob/master/Metaprogramming%20in%20.NET.pptx </a:t>
             </a:r>
           </a:p>
           <a:p>
@@ -19496,13 +19496,13 @@
 <ds:datastoreItem xmlns:ds="http://schemas.openxmlformats.org/officeDocument/2006/customXml" ds:itemID="{65A3A91F-3324-4EE4-8BF2-C3B78E1D1674}">
   <ds:schemaRefs>
     <ds:schemaRef ds:uri="http://purl.org/dc/elements/1.1/"/>
+    <ds:schemaRef ds:uri="http://schemas.microsoft.com/office/2006/metadata/properties"/>
+    <ds:schemaRef ds:uri="http://purl.org/dc/terms/"/>
     <ds:schemaRef ds:uri="http://schemas.openxmlformats.org/package/2006/metadata/core-properties"/>
+    <ds:schemaRef ds:uri="http://schemas.microsoft.com/office/2006/documentManagement/types"/>
+    <ds:schemaRef ds:uri="http://schemas.microsoft.com/office/infopath/2007/PartnerControls"/>
+    <ds:schemaRef ds:uri="f0d6b4bb-fd12-4740-8884-687737dcca9a"/>
     <ds:schemaRef ds:uri="http://www.w3.org/XML/1998/namespace"/>
-    <ds:schemaRef ds:uri="http://schemas.microsoft.com/office/infopath/2007/PartnerControls"/>
-    <ds:schemaRef ds:uri="http://purl.org/dc/terms/"/>
-    <ds:schemaRef ds:uri="http://schemas.microsoft.com/office/2006/metadata/properties"/>
-    <ds:schemaRef ds:uri="http://schemas.microsoft.com/office/2006/documentManagement/types"/>
-    <ds:schemaRef ds:uri="f0d6b4bb-fd12-4740-8884-687737dcca9a"/>
     <ds:schemaRef ds:uri="http://purl.org/dc/dcmitype/"/>
   </ds:schemaRefs>
 </ds:datastoreItem>

</xml_diff>

<commit_message>
Updated decks from CodeMash
</commit_message>
<xml_diff>
--- a/Metaprogramming in .NET.pptx
+++ b/Metaprogramming in .NET.pptx
@@ -257,7 +257,7 @@
           <a:p>
             <a:fld id="{9ECE5BDF-9B7E-3646-B6C9-FC2C3E116129}" type="datetimeFigureOut">
               <a:rPr lang="en-US" smtClean="0"/>
-              <a:t>1/3/2019</a:t>
+              <a:t>1/9/2019</a:t>
             </a:fld>
             <a:endParaRPr lang="en-US"/>
           </a:p>
@@ -15377,8 +15377,8 @@
         </p:nvSpPr>
         <p:spPr>
           <a:xfrm>
-            <a:off x="3158980" y="3117279"/>
-            <a:ext cx="5753908" cy="2308324"/>
+            <a:off x="3158980" y="2893759"/>
+            <a:ext cx="5753908" cy="3046988"/>
           </a:xfrm>
           <a:prstGeom prst="rect">
             <a:avLst/>
@@ -15515,6 +15515,28 @@
                 <a:cs typeface="Consolas" panose="020B0609020204030204" pitchFamily="49" charset="0"/>
               </a:rPr>
               <a:t>chunk.CallMe</a:t>
+            </a:r>
+            <a:r>
+              <a:rPr lang="en-US" sz="2400" dirty="0">
+                <a:latin typeface="Consolas" panose="020B0609020204030204" pitchFamily="49" charset="0"/>
+                <a:cs typeface="Consolas" panose="020B0609020204030204" pitchFamily="49" charset="0"/>
+              </a:rPr>
+              <a:t>();</a:t>
+            </a:r>
+          </a:p>
+          <a:p>
+            <a:endParaRPr lang="en-US" sz="2400" dirty="0">
+              <a:latin typeface="Consolas" panose="020B0609020204030204" pitchFamily="49" charset="0"/>
+              <a:cs typeface="Consolas" panose="020B0609020204030204" pitchFamily="49" charset="0"/>
+            </a:endParaRPr>
+          </a:p>
+          <a:p>
+            <a:r>
+              <a:rPr lang="en-US" sz="2400" dirty="0" err="1">
+                <a:latin typeface="Consolas" panose="020B0609020204030204" pitchFamily="49" charset="0"/>
+                <a:cs typeface="Consolas" panose="020B0609020204030204" pitchFamily="49" charset="0"/>
+              </a:rPr>
+              <a:t>rock.Verify</a:t>
             </a:r>
             <a:r>
               <a:rPr lang="en-US" sz="2400" dirty="0">
@@ -15600,14 +15622,15 @@
         <p:nvCxnSpPr>
           <p:cNvPr id="5" name="Straight Arrow Connector 4"/>
           <p:cNvCxnSpPr>
+            <a:cxnSpLocks/>
             <a:endCxn id="12" idx="2"/>
           </p:cNvCxnSpPr>
           <p:nvPr/>
         </p:nvCxnSpPr>
         <p:spPr>
           <a:xfrm flipV="1">
-            <a:off x="6511332" y="2202880"/>
-            <a:ext cx="1608073" cy="2419362"/>
+            <a:off x="6604000" y="2202880"/>
+            <a:ext cx="1515405" cy="2155760"/>
           </a:xfrm>
           <a:prstGeom prst="straightConnector1">
             <a:avLst/>
@@ -18051,8 +18074,8 @@
         </p:nvSpPr>
         <p:spPr>
           <a:xfrm>
-            <a:off x="5610225" y="6276894"/>
-            <a:ext cx="6581775" cy="453605"/>
+            <a:off x="3962400" y="6276894"/>
+            <a:ext cx="8229601" cy="453605"/>
           </a:xfrm>
           <a:prstGeom prst="rect">
             <a:avLst/>
@@ -18467,8 +18490,8 @@
         </p:nvSpPr>
         <p:spPr>
           <a:xfrm>
-            <a:off x="5610225" y="6276894"/>
-            <a:ext cx="6581775" cy="453605"/>
+            <a:off x="4094481" y="6276894"/>
+            <a:ext cx="8097520" cy="453605"/>
           </a:xfrm>
           <a:prstGeom prst="rect">
             <a:avLst/>
@@ -19273,6 +19296,15 @@
 </file>
 
 <file path=customXml/item1.xml><?xml version="1.0" encoding="utf-8"?>
+<?mso-contentType ?>
+<FormTemplates xmlns="http://schemas.microsoft.com/sharepoint/v3/contenttype/forms">
+  <Display>DocumentLibraryForm</Display>
+  <Edit>DocumentLibraryForm</Edit>
+  <New>DocumentLibraryForm</New>
+</FormTemplates>
+</file>
+
+<file path=customXml/item2.xml><?xml version="1.0" encoding="utf-8"?>
 <p:properties xmlns:p="http://schemas.microsoft.com/office/2006/metadata/properties" xmlns:xsi="http://www.w3.org/2001/XMLSchema-instance" xmlns:pc="http://schemas.microsoft.com/office/infopath/2007/PartnerControls">
   <documentManagement>
     <Company xmlns="f0d6b4bb-fd12-4740-8884-687737dcca9a">Magenic</Company>
@@ -19283,15 +19315,6 @@
     <Industry_x002f_Vertical xmlns="f0d6b4bb-fd12-4740-8884-687737dcca9a" xsi:nil="true"/>
   </documentManagement>
 </p:properties>
-</file>
-
-<file path=customXml/item2.xml><?xml version="1.0" encoding="utf-8"?>
-<?mso-contentType ?>
-<FormTemplates xmlns="http://schemas.microsoft.com/sharepoint/v3/contenttype/forms">
-  <Display>DocumentLibraryForm</Display>
-  <Edit>DocumentLibraryForm</Edit>
-  <New>DocumentLibraryForm</New>
-</FormTemplates>
 </file>
 
 <file path=customXml/item3.xml><?xml version="1.0" encoding="utf-8"?>
@@ -19493,6 +19516,14 @@
 </file>
 
 <file path=customXml/itemProps1.xml><?xml version="1.0" encoding="utf-8"?>
+<ds:datastoreItem xmlns:ds="http://schemas.openxmlformats.org/officeDocument/2006/customXml" ds:itemID="{D18D97D8-3C52-47EE-88EC-CF46155D7428}">
+  <ds:schemaRefs>
+    <ds:schemaRef ds:uri="http://schemas.microsoft.com/sharepoint/v3/contenttype/forms"/>
+  </ds:schemaRefs>
+</ds:datastoreItem>
+</file>
+
+<file path=customXml/itemProps2.xml><?xml version="1.0" encoding="utf-8"?>
 <ds:datastoreItem xmlns:ds="http://schemas.openxmlformats.org/officeDocument/2006/customXml" ds:itemID="{65A3A91F-3324-4EE4-8BF2-C3B78E1D1674}">
   <ds:schemaRefs>
     <ds:schemaRef ds:uri="http://purl.org/dc/elements/1.1/"/>
@@ -19504,14 +19535,6 @@
     <ds:schemaRef ds:uri="f0d6b4bb-fd12-4740-8884-687737dcca9a"/>
     <ds:schemaRef ds:uri="http://www.w3.org/XML/1998/namespace"/>
     <ds:schemaRef ds:uri="http://purl.org/dc/dcmitype/"/>
-  </ds:schemaRefs>
-</ds:datastoreItem>
-</file>
-
-<file path=customXml/itemProps2.xml><?xml version="1.0" encoding="utf-8"?>
-<ds:datastoreItem xmlns:ds="http://schemas.openxmlformats.org/officeDocument/2006/customXml" ds:itemID="{D18D97D8-3C52-47EE-88EC-CF46155D7428}">
-  <ds:schemaRefs>
-    <ds:schemaRef ds:uri="http://schemas.microsoft.com/sharepoint/v3/contenttype/forms"/>
   </ds:schemaRefs>
 </ds:datastoreItem>
 </file>

</xml_diff>